<commit_message>
edit description, rerun notebook
</commit_message>
<xml_diff>
--- a/submissions/phase2/eda.pptx
+++ b/submissions/phase2/eda.pptx
@@ -3993,15 +3993,7 @@
           <a:p>
             <a:r>
               <a:rPr lang="en-US" altLang="zh-CN" dirty="0"/>
-              <a:t>Outlier fraction in all attributes decreased after target encoding. This is reasonable as target encoding can kind of smooth extreme values and make the feature less "</a:t>
-            </a:r>
-            <a:r>
-              <a:rPr lang="en-US" altLang="zh-CN" dirty="0" err="1"/>
-              <a:t>outliery</a:t>
-            </a:r>
-            <a:r>
-              <a:rPr lang="en-US" altLang="zh-CN" dirty="0"/>
-              <a:t>".</a:t>
+              <a:t>There are still some attributes with a significantly high outlier fraction (&gt;20%) after target encoding, this is reasonable for transformed categorical variables.</a:t>
             </a:r>
           </a:p>
         </p:txBody>
@@ -4138,9 +4130,8 @@
           <a:p>
             <a:r>
               <a:rPr lang="en-US" altLang="zh-CN" dirty="0"/>
-              <a:t>However, there are still some attributes with a significantly high outlier fraction (&gt;20%). We will not decide to drop them simply in this step. Some of them seem like useful predictors.</a:t>
-            </a:r>
-            <a:endParaRPr lang="zh-CN" altLang="en-US" dirty="0"/>
+              <a:t>We will not decide to drop them simply in this step. Considering the domain knowledge, some of them may be useful predictors. </a:t>
+            </a:r>
           </a:p>
         </p:txBody>
       </p:sp>

</xml_diff>